<commit_message>
Changing slides to reflect date, people
</commit_message>
<xml_diff>
--- a/slides/MiCM_IntroToR.pptx
+++ b/slides/MiCM_IntroToR.pptx
@@ -646,6 +646,561 @@
           <pc:sldMasterMk cId="142938108" sldId="2147483714"/>
         </pc:sldMasterMkLst>
       </pc:sldMasterChg>
+    </pc:docChg>
+  </pc:docChgLst>
+  <pc:docChgLst>
+    <pc:chgData name="Adrien Osakwe" userId="7a3e290c-eb83-484b-8e3d-d46ef2333477" providerId="ADAL" clId="{6FBBC003-63E5-4DAA-8405-CD7EEDECBC2E}"/>
+    <pc:docChg chg="undo custSel addSld delSld modSld sldOrd modSection">
+      <pc:chgData name="Adrien Osakwe" userId="7a3e290c-eb83-484b-8e3d-d46ef2333477" providerId="ADAL" clId="{6FBBC003-63E5-4DAA-8405-CD7EEDECBC2E}" dt="2024-02-14T16:01:30.496" v="3472" actId="729"/>
+      <pc:docMkLst>
+        <pc:docMk/>
+      </pc:docMkLst>
+      <pc:sldChg chg="del">
+        <pc:chgData name="Adrien Osakwe" userId="7a3e290c-eb83-484b-8e3d-d46ef2333477" providerId="ADAL" clId="{6FBBC003-63E5-4DAA-8405-CD7EEDECBC2E}" dt="2024-02-13T14:01:53.885" v="149" actId="47"/>
+        <pc:sldMkLst>
+          <pc:docMk/>
+          <pc:sldMk cId="3133242724" sldId="262"/>
+        </pc:sldMkLst>
+      </pc:sldChg>
+      <pc:sldChg chg="modSp mod modAnim">
+        <pc:chgData name="Adrien Osakwe" userId="7a3e290c-eb83-484b-8e3d-d46ef2333477" providerId="ADAL" clId="{6FBBC003-63E5-4DAA-8405-CD7EEDECBC2E}" dt="2024-02-14T04:28:51.003" v="3291" actId="113"/>
+        <pc:sldMkLst>
+          <pc:docMk/>
+          <pc:sldMk cId="3891667287" sldId="277"/>
+        </pc:sldMkLst>
+      </pc:sldChg>
+      <pc:sldChg chg="del">
+        <pc:chgData name="Adrien Osakwe" userId="7a3e290c-eb83-484b-8e3d-d46ef2333477" providerId="ADAL" clId="{6FBBC003-63E5-4DAA-8405-CD7EEDECBC2E}" dt="2024-02-13T14:02:27.239" v="154" actId="47"/>
+        <pc:sldMkLst>
+          <pc:docMk/>
+          <pc:sldMk cId="3390364454" sldId="317"/>
+        </pc:sldMkLst>
+      </pc:sldChg>
+      <pc:sldChg chg="modSp mod">
+        <pc:chgData name="Adrien Osakwe" userId="7a3e290c-eb83-484b-8e3d-d46ef2333477" providerId="ADAL" clId="{6FBBC003-63E5-4DAA-8405-CD7EEDECBC2E}" dt="2024-02-14T04:39:54.220" v="3366" actId="20577"/>
+        <pc:sldMkLst>
+          <pc:docMk/>
+          <pc:sldMk cId="3440444125" sldId="318"/>
+        </pc:sldMkLst>
+      </pc:sldChg>
+      <pc:sldChg chg="addSp delSp modSp mod">
+        <pc:chgData name="Adrien Osakwe" userId="7a3e290c-eb83-484b-8e3d-d46ef2333477" providerId="ADAL" clId="{6FBBC003-63E5-4DAA-8405-CD7EEDECBC2E}" dt="2024-02-14T00:48:00.918" v="1450" actId="20577"/>
+        <pc:sldMkLst>
+          <pc:docMk/>
+          <pc:sldMk cId="2289177498" sldId="319"/>
+        </pc:sldMkLst>
+      </pc:sldChg>
+      <pc:sldChg chg="addSp delSp modSp mod">
+        <pc:chgData name="Adrien Osakwe" userId="7a3e290c-eb83-484b-8e3d-d46ef2333477" providerId="ADAL" clId="{6FBBC003-63E5-4DAA-8405-CD7EEDECBC2E}" dt="2024-02-13T14:19:01.310" v="185" actId="20577"/>
+        <pc:sldMkLst>
+          <pc:docMk/>
+          <pc:sldMk cId="2200063611" sldId="320"/>
+        </pc:sldMkLst>
+      </pc:sldChg>
+      <pc:sldChg chg="add ord">
+        <pc:chgData name="Adrien Osakwe" userId="7a3e290c-eb83-484b-8e3d-d46ef2333477" providerId="ADAL" clId="{6FBBC003-63E5-4DAA-8405-CD7EEDECBC2E}" dt="2024-02-13T14:01:56.886" v="152"/>
+        <pc:sldMkLst>
+          <pc:docMk/>
+          <pc:sldMk cId="1324269546" sldId="395"/>
+        </pc:sldMkLst>
+      </pc:sldChg>
+      <pc:sldChg chg="addSp modSp add mod ord">
+        <pc:chgData name="Adrien Osakwe" userId="7a3e290c-eb83-484b-8e3d-d46ef2333477" providerId="ADAL" clId="{6FBBC003-63E5-4DAA-8405-CD7EEDECBC2E}" dt="2024-02-14T00:45:41.456" v="1347" actId="208"/>
+        <pc:sldMkLst>
+          <pc:docMk/>
+          <pc:sldMk cId="3301951615" sldId="396"/>
+        </pc:sldMkLst>
+      </pc:sldChg>
+      <pc:sldChg chg="add">
+        <pc:chgData name="Adrien Osakwe" userId="7a3e290c-eb83-484b-8e3d-d46ef2333477" providerId="ADAL" clId="{6FBBC003-63E5-4DAA-8405-CD7EEDECBC2E}" dt="2024-02-13T14:02:28.836" v="155"/>
+        <pc:sldMkLst>
+          <pc:docMk/>
+          <pc:sldMk cId="25426801" sldId="399"/>
+        </pc:sldMkLst>
+      </pc:sldChg>
+      <pc:sldChg chg="del">
+        <pc:chgData name="Adrien Osakwe" userId="7a3e290c-eb83-484b-8e3d-d46ef2333477" providerId="ADAL" clId="{6FBBC003-63E5-4DAA-8405-CD7EEDECBC2E}" dt="2024-02-13T14:02:22.476" v="153" actId="47"/>
+        <pc:sldMkLst>
+          <pc:docMk/>
+          <pc:sldMk cId="2151930685" sldId="409"/>
+        </pc:sldMkLst>
+      </pc:sldChg>
+      <pc:sldChg chg="modSp modAnim">
+        <pc:chgData name="Adrien Osakwe" userId="7a3e290c-eb83-484b-8e3d-d46ef2333477" providerId="ADAL" clId="{6FBBC003-63E5-4DAA-8405-CD7EEDECBC2E}" dt="2024-02-14T04:29:30.520" v="3292"/>
+        <pc:sldMkLst>
+          <pc:docMk/>
+          <pc:sldMk cId="98069860" sldId="411"/>
+        </pc:sldMkLst>
+      </pc:sldChg>
+      <pc:sldChg chg="modSp mod">
+        <pc:chgData name="Adrien Osakwe" userId="7a3e290c-eb83-484b-8e3d-d46ef2333477" providerId="ADAL" clId="{6FBBC003-63E5-4DAA-8405-CD7EEDECBC2E}" dt="2024-02-14T00:52:12.308" v="1544" actId="20577"/>
+        <pc:sldMkLst>
+          <pc:docMk/>
+          <pc:sldMk cId="4111024130" sldId="412"/>
+        </pc:sldMkLst>
+      </pc:sldChg>
+      <pc:sldChg chg="modSp mod">
+        <pc:chgData name="Adrien Osakwe" userId="7a3e290c-eb83-484b-8e3d-d46ef2333477" providerId="ADAL" clId="{6FBBC003-63E5-4DAA-8405-CD7EEDECBC2E}" dt="2024-02-14T01:46:58.308" v="2599" actId="207"/>
+        <pc:sldMkLst>
+          <pc:docMk/>
+          <pc:sldMk cId="2428786264" sldId="413"/>
+        </pc:sldMkLst>
+      </pc:sldChg>
+      <pc:sldChg chg="modSp mod">
+        <pc:chgData name="Adrien Osakwe" userId="7a3e290c-eb83-484b-8e3d-d46ef2333477" providerId="ADAL" clId="{6FBBC003-63E5-4DAA-8405-CD7EEDECBC2E}" dt="2024-02-14T04:01:19.276" v="3242" actId="207"/>
+        <pc:sldMkLst>
+          <pc:docMk/>
+          <pc:sldMk cId="4293633584" sldId="414"/>
+        </pc:sldMkLst>
+      </pc:sldChg>
+      <pc:sldChg chg="modSp mod">
+        <pc:chgData name="Adrien Osakwe" userId="7a3e290c-eb83-484b-8e3d-d46ef2333477" providerId="ADAL" clId="{6FBBC003-63E5-4DAA-8405-CD7EEDECBC2E}" dt="2024-02-14T04:08:15.728" v="3243" actId="207"/>
+        <pc:sldMkLst>
+          <pc:docMk/>
+          <pc:sldMk cId="1189678410" sldId="415"/>
+        </pc:sldMkLst>
+      </pc:sldChg>
+      <pc:sldChg chg="modSp mod">
+        <pc:chgData name="Adrien Osakwe" userId="7a3e290c-eb83-484b-8e3d-d46ef2333477" providerId="ADAL" clId="{6FBBC003-63E5-4DAA-8405-CD7EEDECBC2E}" dt="2024-02-14T04:11:47.623" v="3246" actId="207"/>
+        <pc:sldMkLst>
+          <pc:docMk/>
+          <pc:sldMk cId="2444987695" sldId="416"/>
+        </pc:sldMkLst>
+      </pc:sldChg>
+      <pc:sldChg chg="modSp add del mod">
+        <pc:chgData name="Adrien Osakwe" userId="7a3e290c-eb83-484b-8e3d-d46ef2333477" providerId="ADAL" clId="{6FBBC003-63E5-4DAA-8405-CD7EEDECBC2E}" dt="2024-02-14T03:55:29.429" v="2969" actId="207"/>
+        <pc:sldMkLst>
+          <pc:docMk/>
+          <pc:sldMk cId="439019801" sldId="417"/>
+        </pc:sldMkLst>
+      </pc:sldChg>
+      <pc:sldChg chg="modSp del mod">
+        <pc:chgData name="Adrien Osakwe" userId="7a3e290c-eb83-484b-8e3d-d46ef2333477" providerId="ADAL" clId="{6FBBC003-63E5-4DAA-8405-CD7EEDECBC2E}" dt="2024-02-14T02:39:17.480" v="2962" actId="2696"/>
+        <pc:sldMkLst>
+          <pc:docMk/>
+          <pc:sldMk cId="2634833872" sldId="417"/>
+        </pc:sldMkLst>
+      </pc:sldChg>
+      <pc:sldChg chg="modSp mod">
+        <pc:chgData name="Adrien Osakwe" userId="7a3e290c-eb83-484b-8e3d-d46ef2333477" providerId="ADAL" clId="{6FBBC003-63E5-4DAA-8405-CD7EEDECBC2E}" dt="2024-02-14T04:11:36.152" v="3244" actId="207"/>
+        <pc:sldMkLst>
+          <pc:docMk/>
+          <pc:sldMk cId="1346597622" sldId="418"/>
+        </pc:sldMkLst>
+      </pc:sldChg>
+      <pc:sldChg chg="add">
+        <pc:chgData name="Adrien Osakwe" userId="7a3e290c-eb83-484b-8e3d-d46ef2333477" providerId="ADAL" clId="{6FBBC003-63E5-4DAA-8405-CD7EEDECBC2E}" dt="2024-02-14T03:45:21.495" v="2967"/>
+        <pc:sldMkLst>
+          <pc:docMk/>
+          <pc:sldMk cId="513973128" sldId="419"/>
+        </pc:sldMkLst>
+      </pc:sldChg>
+      <pc:sldChg chg="modSp del mod">
+        <pc:chgData name="Adrien Osakwe" userId="7a3e290c-eb83-484b-8e3d-d46ef2333477" providerId="ADAL" clId="{6FBBC003-63E5-4DAA-8405-CD7EEDECBC2E}" dt="2024-02-14T02:39:17.480" v="2962" actId="2696"/>
+        <pc:sldMkLst>
+          <pc:docMk/>
+          <pc:sldMk cId="2227572526" sldId="419"/>
+        </pc:sldMkLst>
+      </pc:sldChg>
+      <pc:sldChg chg="add del">
+        <pc:chgData name="Adrien Osakwe" userId="7a3e290c-eb83-484b-8e3d-d46ef2333477" providerId="ADAL" clId="{6FBBC003-63E5-4DAA-8405-CD7EEDECBC2E}" dt="2024-02-14T03:45:16.997" v="2966" actId="2696"/>
+        <pc:sldMkLst>
+          <pc:docMk/>
+          <pc:sldMk cId="3785448673" sldId="419"/>
+        </pc:sldMkLst>
+      </pc:sldChg>
+      <pc:sldChg chg="modSp mod">
+        <pc:chgData name="Adrien Osakwe" userId="7a3e290c-eb83-484b-8e3d-d46ef2333477" providerId="ADAL" clId="{6FBBC003-63E5-4DAA-8405-CD7EEDECBC2E}" dt="2024-02-13T14:48:56.653" v="217" actId="113"/>
+        <pc:sldMkLst>
+          <pc:docMk/>
+          <pc:sldMk cId="1880436319" sldId="420"/>
+        </pc:sldMkLst>
+      </pc:sldChg>
+      <pc:sldChg chg="modSp mod ord">
+        <pc:chgData name="Adrien Osakwe" userId="7a3e290c-eb83-484b-8e3d-d46ef2333477" providerId="ADAL" clId="{6FBBC003-63E5-4DAA-8405-CD7EEDECBC2E}" dt="2024-02-14T02:28:44.632" v="2646"/>
+        <pc:sldMkLst>
+          <pc:docMk/>
+          <pc:sldMk cId="1410062465" sldId="421"/>
+        </pc:sldMkLst>
+      </pc:sldChg>
+      <pc:sldChg chg="modSp mod ord">
+        <pc:chgData name="Adrien Osakwe" userId="7a3e290c-eb83-484b-8e3d-d46ef2333477" providerId="ADAL" clId="{6FBBC003-63E5-4DAA-8405-CD7EEDECBC2E}" dt="2024-02-14T02:27:47.922" v="2644"/>
+        <pc:sldMkLst>
+          <pc:docMk/>
+          <pc:sldMk cId="108575568" sldId="423"/>
+        </pc:sldMkLst>
+      </pc:sldChg>
+      <pc:sldChg chg="modSp mod">
+        <pc:chgData name="Adrien Osakwe" userId="7a3e290c-eb83-484b-8e3d-d46ef2333477" providerId="ADAL" clId="{6FBBC003-63E5-4DAA-8405-CD7EEDECBC2E}" dt="2024-02-14T02:08:06.158" v="2642" actId="5736"/>
+        <pc:sldMkLst>
+          <pc:docMk/>
+          <pc:sldMk cId="1212990023" sldId="425"/>
+        </pc:sldMkLst>
+      </pc:sldChg>
+      <pc:sldChg chg="modSp mod">
+        <pc:chgData name="Adrien Osakwe" userId="7a3e290c-eb83-484b-8e3d-d46ef2333477" providerId="ADAL" clId="{6FBBC003-63E5-4DAA-8405-CD7EEDECBC2E}" dt="2024-02-13T14:48:59.570" v="218" actId="113"/>
+        <pc:sldMkLst>
+          <pc:docMk/>
+          <pc:sldMk cId="3223212124" sldId="426"/>
+        </pc:sldMkLst>
+      </pc:sldChg>
+      <pc:sldChg chg="modSp mod">
+        <pc:chgData name="Adrien Osakwe" userId="7a3e290c-eb83-484b-8e3d-d46ef2333477" providerId="ADAL" clId="{6FBBC003-63E5-4DAA-8405-CD7EEDECBC2E}" dt="2024-02-13T14:49:02.150" v="219" actId="113"/>
+        <pc:sldMkLst>
+          <pc:docMk/>
+          <pc:sldMk cId="4245281921" sldId="428"/>
+        </pc:sldMkLst>
+      </pc:sldChg>
+      <pc:sldChg chg="modSp mod">
+        <pc:chgData name="Adrien Osakwe" userId="7a3e290c-eb83-484b-8e3d-d46ef2333477" providerId="ADAL" clId="{6FBBC003-63E5-4DAA-8405-CD7EEDECBC2E}" dt="2024-02-13T14:49:04.485" v="220" actId="113"/>
+        <pc:sldMkLst>
+          <pc:docMk/>
+          <pc:sldMk cId="3281809004" sldId="429"/>
+        </pc:sldMkLst>
+      </pc:sldChg>
+      <pc:sldChg chg="modSp mod">
+        <pc:chgData name="Adrien Osakwe" userId="7a3e290c-eb83-484b-8e3d-d46ef2333477" providerId="ADAL" clId="{6FBBC003-63E5-4DAA-8405-CD7EEDECBC2E}" dt="2024-02-13T14:48:10.877" v="205" actId="113"/>
+        <pc:sldMkLst>
+          <pc:docMk/>
+          <pc:sldMk cId="2267835305" sldId="430"/>
+        </pc:sldMkLst>
+      </pc:sldChg>
+      <pc:sldChg chg="modSp mod">
+        <pc:chgData name="Adrien Osakwe" userId="7a3e290c-eb83-484b-8e3d-d46ef2333477" providerId="ADAL" clId="{6FBBC003-63E5-4DAA-8405-CD7EEDECBC2E}" dt="2024-02-14T01:58:50.083" v="2635" actId="5736"/>
+        <pc:sldMkLst>
+          <pc:docMk/>
+          <pc:sldMk cId="2889724734" sldId="431"/>
+        </pc:sldMkLst>
+      </pc:sldChg>
+      <pc:sldChg chg="modSp mod">
+        <pc:chgData name="Adrien Osakwe" userId="7a3e290c-eb83-484b-8e3d-d46ef2333477" providerId="ADAL" clId="{6FBBC003-63E5-4DAA-8405-CD7EEDECBC2E}" dt="2024-02-14T01:26:31.104" v="2443" actId="5736"/>
+        <pc:sldMkLst>
+          <pc:docMk/>
+          <pc:sldMk cId="701040556" sldId="432"/>
+        </pc:sldMkLst>
+      </pc:sldChg>
+      <pc:sldChg chg="del">
+        <pc:chgData name="Adrien Osakwe" userId="7a3e290c-eb83-484b-8e3d-d46ef2333477" providerId="ADAL" clId="{6FBBC003-63E5-4DAA-8405-CD7EEDECBC2E}" dt="2024-02-14T02:34:21.485" v="2647" actId="47"/>
+        <pc:sldMkLst>
+          <pc:docMk/>
+          <pc:sldMk cId="3314207375" sldId="433"/>
+        </pc:sldMkLst>
+      </pc:sldChg>
+      <pc:sldChg chg="del">
+        <pc:chgData name="Adrien Osakwe" userId="7a3e290c-eb83-484b-8e3d-d46ef2333477" providerId="ADAL" clId="{6FBBC003-63E5-4DAA-8405-CD7EEDECBC2E}" dt="2024-02-14T02:39:17.480" v="2962" actId="2696"/>
+        <pc:sldMkLst>
+          <pc:docMk/>
+          <pc:sldMk cId="1029239482" sldId="439"/>
+        </pc:sldMkLst>
+      </pc:sldChg>
+      <pc:sldChg chg="add ord">
+        <pc:chgData name="Adrien Osakwe" userId="7a3e290c-eb83-484b-8e3d-d46ef2333477" providerId="ADAL" clId="{6FBBC003-63E5-4DAA-8405-CD7EEDECBC2E}" dt="2024-02-14T04:36:45.184" v="3356"/>
+        <pc:sldMkLst>
+          <pc:docMk/>
+          <pc:sldMk cId="2459570573" sldId="439"/>
+        </pc:sldMkLst>
+      </pc:sldChg>
+      <pc:sldChg chg="modSp mod">
+        <pc:chgData name="Adrien Osakwe" userId="7a3e290c-eb83-484b-8e3d-d46ef2333477" providerId="ADAL" clId="{6FBBC003-63E5-4DAA-8405-CD7EEDECBC2E}" dt="2024-02-14T04:11:41.916" v="3245" actId="207"/>
+        <pc:sldMkLst>
+          <pc:docMk/>
+          <pc:sldMk cId="4003718646" sldId="441"/>
+        </pc:sldMkLst>
+      </pc:sldChg>
+      <pc:sldChg chg="modSp mod">
+        <pc:chgData name="Adrien Osakwe" userId="7a3e290c-eb83-484b-8e3d-d46ef2333477" providerId="ADAL" clId="{6FBBC003-63E5-4DAA-8405-CD7EEDECBC2E}" dt="2024-02-14T02:03:05.199" v="2637" actId="5736"/>
+        <pc:sldMkLst>
+          <pc:docMk/>
+          <pc:sldMk cId="1491768522" sldId="442"/>
+        </pc:sldMkLst>
+      </pc:sldChg>
+      <pc:sldChg chg="modSp del mod">
+        <pc:chgData name="Adrien Osakwe" userId="7a3e290c-eb83-484b-8e3d-d46ef2333477" providerId="ADAL" clId="{6FBBC003-63E5-4DAA-8405-CD7EEDECBC2E}" dt="2024-02-14T02:39:17.480" v="2962" actId="2696"/>
+        <pc:sldMkLst>
+          <pc:docMk/>
+          <pc:sldMk cId="1920594278" sldId="443"/>
+        </pc:sldMkLst>
+      </pc:sldChg>
+      <pc:sldChg chg="add">
+        <pc:chgData name="Adrien Osakwe" userId="7a3e290c-eb83-484b-8e3d-d46ef2333477" providerId="ADAL" clId="{6FBBC003-63E5-4DAA-8405-CD7EEDECBC2E}" dt="2024-02-14T02:39:24.219" v="2963"/>
+        <pc:sldMkLst>
+          <pc:docMk/>
+          <pc:sldMk cId="4191426825" sldId="443"/>
+        </pc:sldMkLst>
+      </pc:sldChg>
+      <pc:sldChg chg="addSp delSp add mod">
+        <pc:chgData name="Adrien Osakwe" userId="7a3e290c-eb83-484b-8e3d-d46ef2333477" providerId="ADAL" clId="{6FBBC003-63E5-4DAA-8405-CD7EEDECBC2E}" dt="2024-02-14T04:33:50.744" v="3305" actId="22"/>
+        <pc:sldMkLst>
+          <pc:docMk/>
+          <pc:sldMk cId="1956759140" sldId="444"/>
+        </pc:sldMkLst>
+      </pc:sldChg>
+      <pc:sldChg chg="modSp del mod">
+        <pc:chgData name="Adrien Osakwe" userId="7a3e290c-eb83-484b-8e3d-d46ef2333477" providerId="ADAL" clId="{6FBBC003-63E5-4DAA-8405-CD7EEDECBC2E}" dt="2024-02-14T02:39:17.480" v="2962" actId="2696"/>
+        <pc:sldMkLst>
+          <pc:docMk/>
+          <pc:sldMk cId="3928505110" sldId="444"/>
+        </pc:sldMkLst>
+      </pc:sldChg>
+      <pc:sldChg chg="add del">
+        <pc:chgData name="Adrien Osakwe" userId="7a3e290c-eb83-484b-8e3d-d46ef2333477" providerId="ADAL" clId="{6FBBC003-63E5-4DAA-8405-CD7EEDECBC2E}" dt="2024-02-14T03:45:16.997" v="2966" actId="2696"/>
+        <pc:sldMkLst>
+          <pc:docMk/>
+          <pc:sldMk cId="3288183379" sldId="445"/>
+        </pc:sldMkLst>
+      </pc:sldChg>
+      <pc:sldChg chg="modSp del mod">
+        <pc:chgData name="Adrien Osakwe" userId="7a3e290c-eb83-484b-8e3d-d46ef2333477" providerId="ADAL" clId="{6FBBC003-63E5-4DAA-8405-CD7EEDECBC2E}" dt="2024-02-14T02:39:17.480" v="2962" actId="2696"/>
+        <pc:sldMkLst>
+          <pc:docMk/>
+          <pc:sldMk cId="3964093048" sldId="445"/>
+        </pc:sldMkLst>
+      </pc:sldChg>
+      <pc:sldChg chg="add">
+        <pc:chgData name="Adrien Osakwe" userId="7a3e290c-eb83-484b-8e3d-d46ef2333477" providerId="ADAL" clId="{6FBBC003-63E5-4DAA-8405-CD7EEDECBC2E}" dt="2024-02-14T03:45:21.495" v="2967"/>
+        <pc:sldMkLst>
+          <pc:docMk/>
+          <pc:sldMk cId="4109084214" sldId="445"/>
+        </pc:sldMkLst>
+      </pc:sldChg>
+      <pc:sldChg chg="modSp mod">
+        <pc:chgData name="Adrien Osakwe" userId="7a3e290c-eb83-484b-8e3d-d46ef2333477" providerId="ADAL" clId="{6FBBC003-63E5-4DAA-8405-CD7EEDECBC2E}" dt="2024-02-13T14:49:28.195" v="227" actId="113"/>
+        <pc:sldMkLst>
+          <pc:docMk/>
+          <pc:sldMk cId="250423083" sldId="446"/>
+        </pc:sldMkLst>
+      </pc:sldChg>
+      <pc:sldChg chg="modSp mod">
+        <pc:chgData name="Adrien Osakwe" userId="7a3e290c-eb83-484b-8e3d-d46ef2333477" providerId="ADAL" clId="{6FBBC003-63E5-4DAA-8405-CD7EEDECBC2E}" dt="2024-02-13T14:49:35.677" v="229" actId="113"/>
+        <pc:sldMkLst>
+          <pc:docMk/>
+          <pc:sldMk cId="241318341" sldId="447"/>
+        </pc:sldMkLst>
+      </pc:sldChg>
+      <pc:sldChg chg="modSp mod">
+        <pc:chgData name="Adrien Osakwe" userId="7a3e290c-eb83-484b-8e3d-d46ef2333477" providerId="ADAL" clId="{6FBBC003-63E5-4DAA-8405-CD7EEDECBC2E}" dt="2024-02-13T14:49:33.805" v="228" actId="113"/>
+        <pc:sldMkLst>
+          <pc:docMk/>
+          <pc:sldMk cId="3470290159" sldId="448"/>
+        </pc:sldMkLst>
+      </pc:sldChg>
+      <pc:sldChg chg="modSp mod">
+        <pc:chgData name="Adrien Osakwe" userId="7a3e290c-eb83-484b-8e3d-d46ef2333477" providerId="ADAL" clId="{6FBBC003-63E5-4DAA-8405-CD7EEDECBC2E}" dt="2024-02-13T14:49:38.270" v="230" actId="113"/>
+        <pc:sldMkLst>
+          <pc:docMk/>
+          <pc:sldMk cId="4269158014" sldId="449"/>
+        </pc:sldMkLst>
+      </pc:sldChg>
+      <pc:sldChg chg="modSp mod">
+        <pc:chgData name="Adrien Osakwe" userId="7a3e290c-eb83-484b-8e3d-d46ef2333477" providerId="ADAL" clId="{6FBBC003-63E5-4DAA-8405-CD7EEDECBC2E}" dt="2024-02-13T14:49:42.160" v="231" actId="113"/>
+        <pc:sldMkLst>
+          <pc:docMk/>
+          <pc:sldMk cId="3813321520" sldId="450"/>
+        </pc:sldMkLst>
+      </pc:sldChg>
+      <pc:sldChg chg="modSp mod">
+        <pc:chgData name="Adrien Osakwe" userId="7a3e290c-eb83-484b-8e3d-d46ef2333477" providerId="ADAL" clId="{6FBBC003-63E5-4DAA-8405-CD7EEDECBC2E}" dt="2024-02-13T14:49:45.404" v="232" actId="113"/>
+        <pc:sldMkLst>
+          <pc:docMk/>
+          <pc:sldMk cId="450508802" sldId="451"/>
+        </pc:sldMkLst>
+      </pc:sldChg>
+      <pc:sldChg chg="modSp mod">
+        <pc:chgData name="Adrien Osakwe" userId="7a3e290c-eb83-484b-8e3d-d46ef2333477" providerId="ADAL" clId="{6FBBC003-63E5-4DAA-8405-CD7EEDECBC2E}" dt="2024-02-13T14:49:47.728" v="233" actId="113"/>
+        <pc:sldMkLst>
+          <pc:docMk/>
+          <pc:sldMk cId="1454694018" sldId="452"/>
+        </pc:sldMkLst>
+      </pc:sldChg>
+      <pc:sldChg chg="del">
+        <pc:chgData name="Adrien Osakwe" userId="7a3e290c-eb83-484b-8e3d-d46ef2333477" providerId="ADAL" clId="{6FBBC003-63E5-4DAA-8405-CD7EEDECBC2E}" dt="2024-02-13T14:50:03.708" v="235" actId="47"/>
+        <pc:sldMkLst>
+          <pc:docMk/>
+          <pc:sldMk cId="920428551" sldId="455"/>
+        </pc:sldMkLst>
+      </pc:sldChg>
+      <pc:sldChg chg="modSp new mod ord">
+        <pc:chgData name="Adrien Osakwe" userId="7a3e290c-eb83-484b-8e3d-d46ef2333477" providerId="ADAL" clId="{6FBBC003-63E5-4DAA-8405-CD7EEDECBC2E}" dt="2024-02-13T14:51:12.178" v="398"/>
+        <pc:sldMkLst>
+          <pc:docMk/>
+          <pc:sldMk cId="3549088750" sldId="455"/>
+        </pc:sldMkLst>
+      </pc:sldChg>
+      <pc:sldChg chg="new del ord">
+        <pc:chgData name="Adrien Osakwe" userId="7a3e290c-eb83-484b-8e3d-d46ef2333477" providerId="ADAL" clId="{6FBBC003-63E5-4DAA-8405-CD7EEDECBC2E}" dt="2024-02-13T19:36:25.973" v="404" actId="47"/>
+        <pc:sldMkLst>
+          <pc:docMk/>
+          <pc:sldMk cId="243438360" sldId="456"/>
+        </pc:sldMkLst>
+      </pc:sldChg>
+      <pc:sldChg chg="new del">
+        <pc:chgData name="Adrien Osakwe" userId="7a3e290c-eb83-484b-8e3d-d46ef2333477" providerId="ADAL" clId="{6FBBC003-63E5-4DAA-8405-CD7EEDECBC2E}" dt="2024-02-13T19:36:18.868" v="400" actId="680"/>
+        <pc:sldMkLst>
+          <pc:docMk/>
+          <pc:sldMk cId="2037220900" sldId="456"/>
+        </pc:sldMkLst>
+      </pc:sldChg>
+      <pc:sldChg chg="del">
+        <pc:chgData name="Adrien Osakwe" userId="7a3e290c-eb83-484b-8e3d-d46ef2333477" providerId="ADAL" clId="{6FBBC003-63E5-4DAA-8405-CD7EEDECBC2E}" dt="2024-02-13T14:50:02.022" v="234" actId="47"/>
+        <pc:sldMkLst>
+          <pc:docMk/>
+          <pc:sldMk cId="2446723814" sldId="456"/>
+        </pc:sldMkLst>
+      </pc:sldChg>
+      <pc:sldChg chg="modSp new del mod ord">
+        <pc:chgData name="Adrien Osakwe" userId="7a3e290c-eb83-484b-8e3d-d46ef2333477" providerId="ADAL" clId="{6FBBC003-63E5-4DAA-8405-CD7EEDECBC2E}" dt="2024-02-14T04:12:39.422" v="3248" actId="47"/>
+        <pc:sldMkLst>
+          <pc:docMk/>
+          <pc:sldMk cId="3430613274" sldId="456"/>
+        </pc:sldMkLst>
+      </pc:sldChg>
+      <pc:sldChg chg="modSp new mod modAnim">
+        <pc:chgData name="Adrien Osakwe" userId="7a3e290c-eb83-484b-8e3d-d46ef2333477" providerId="ADAL" clId="{6FBBC003-63E5-4DAA-8405-CD7EEDECBC2E}" dt="2024-02-14T04:29:53.166" v="3294"/>
+        <pc:sldMkLst>
+          <pc:docMk/>
+          <pc:sldMk cId="4274729827" sldId="457"/>
+        </pc:sldMkLst>
+      </pc:sldChg>
+      <pc:sldChg chg="addSp delSp modSp new mod">
+        <pc:chgData name="Adrien Osakwe" userId="7a3e290c-eb83-484b-8e3d-d46ef2333477" providerId="ADAL" clId="{6FBBC003-63E5-4DAA-8405-CD7EEDECBC2E}" dt="2024-02-14T04:45:28.242" v="3380" actId="1076"/>
+        <pc:sldMkLst>
+          <pc:docMk/>
+          <pc:sldMk cId="3241240956" sldId="458"/>
+        </pc:sldMkLst>
+      </pc:sldChg>
+      <pc:sldChg chg="add del">
+        <pc:chgData name="Adrien Osakwe" userId="7a3e290c-eb83-484b-8e3d-d46ef2333477" providerId="ADAL" clId="{6FBBC003-63E5-4DAA-8405-CD7EEDECBC2E}" dt="2024-02-13T22:15:34.169" v="1126" actId="47"/>
+        <pc:sldMkLst>
+          <pc:docMk/>
+          <pc:sldMk cId="3582742575" sldId="458"/>
+        </pc:sldMkLst>
+      </pc:sldChg>
+      <pc:sldChg chg="new del">
+        <pc:chgData name="Adrien Osakwe" userId="7a3e290c-eb83-484b-8e3d-d46ef2333477" providerId="ADAL" clId="{6FBBC003-63E5-4DAA-8405-CD7EEDECBC2E}" dt="2024-02-14T00:47:16.043" v="1369" actId="47"/>
+        <pc:sldMkLst>
+          <pc:docMk/>
+          <pc:sldMk cId="1250385595" sldId="459"/>
+        </pc:sldMkLst>
+      </pc:sldChg>
+      <pc:sldChg chg="new del">
+        <pc:chgData name="Adrien Osakwe" userId="7a3e290c-eb83-484b-8e3d-d46ef2333477" providerId="ADAL" clId="{6FBBC003-63E5-4DAA-8405-CD7EEDECBC2E}" dt="2024-02-14T00:47:11.127" v="1367" actId="47"/>
+        <pc:sldMkLst>
+          <pc:docMk/>
+          <pc:sldMk cId="2002959969" sldId="459"/>
+        </pc:sldMkLst>
+      </pc:sldChg>
+      <pc:sldChg chg="modSp new mod">
+        <pc:chgData name="Adrien Osakwe" userId="7a3e290c-eb83-484b-8e3d-d46ef2333477" providerId="ADAL" clId="{6FBBC003-63E5-4DAA-8405-CD7EEDECBC2E}" dt="2024-02-14T04:27:33.333" v="3277" actId="20577"/>
+        <pc:sldMkLst>
+          <pc:docMk/>
+          <pc:sldMk cId="2253242404" sldId="459"/>
+        </pc:sldMkLst>
+      </pc:sldChg>
+      <pc:sldChg chg="new del">
+        <pc:chgData name="Adrien Osakwe" userId="7a3e290c-eb83-484b-8e3d-d46ef2333477" providerId="ADAL" clId="{6FBBC003-63E5-4DAA-8405-CD7EEDECBC2E}" dt="2024-02-14T00:52:25.276" v="1546" actId="47"/>
+        <pc:sldMkLst>
+          <pc:docMk/>
+          <pc:sldMk cId="2113721749" sldId="460"/>
+        </pc:sldMkLst>
+      </pc:sldChg>
+      <pc:sldChg chg="addSp delSp modSp new mod modAnim">
+        <pc:chgData name="Adrien Osakwe" userId="7a3e290c-eb83-484b-8e3d-d46ef2333477" providerId="ADAL" clId="{6FBBC003-63E5-4DAA-8405-CD7EEDECBC2E}" dt="2024-02-14T04:28:12.365" v="3288" actId="12"/>
+        <pc:sldMkLst>
+          <pc:docMk/>
+          <pc:sldMk cId="4225761275" sldId="460"/>
+        </pc:sldMkLst>
+      </pc:sldChg>
+      <pc:sldChg chg="addSp modSp new del mod">
+        <pc:chgData name="Adrien Osakwe" userId="7a3e290c-eb83-484b-8e3d-d46ef2333477" providerId="ADAL" clId="{6FBBC003-63E5-4DAA-8405-CD7EEDECBC2E}" dt="2024-02-14T00:59:52.860" v="1983" actId="47"/>
+        <pc:sldMkLst>
+          <pc:docMk/>
+          <pc:sldMk cId="69382932" sldId="461"/>
+        </pc:sldMkLst>
+      </pc:sldChg>
+      <pc:sldChg chg="addSp delSp modSp new mod modAnim">
+        <pc:chgData name="Adrien Osakwe" userId="7a3e290c-eb83-484b-8e3d-d46ef2333477" providerId="ADAL" clId="{6FBBC003-63E5-4DAA-8405-CD7EEDECBC2E}" dt="2024-02-14T04:30:08.580" v="3296"/>
+        <pc:sldMkLst>
+          <pc:docMk/>
+          <pc:sldMk cId="2801728874" sldId="461"/>
+        </pc:sldMkLst>
+      </pc:sldChg>
+      <pc:sldChg chg="addSp delSp modSp new mod">
+        <pc:chgData name="Adrien Osakwe" userId="7a3e290c-eb83-484b-8e3d-d46ef2333477" providerId="ADAL" clId="{6FBBC003-63E5-4DAA-8405-CD7EEDECBC2E}" dt="2024-02-14T01:41:39.448" v="2595" actId="14100"/>
+        <pc:sldMkLst>
+          <pc:docMk/>
+          <pc:sldMk cId="2048934135" sldId="462"/>
+        </pc:sldMkLst>
+      </pc:sldChg>
+      <pc:sldChg chg="modSp new del mod">
+        <pc:chgData name="Adrien Osakwe" userId="7a3e290c-eb83-484b-8e3d-d46ef2333477" providerId="ADAL" clId="{6FBBC003-63E5-4DAA-8405-CD7EEDECBC2E}" dt="2024-02-14T02:34:52.397" v="2655" actId="47"/>
+        <pc:sldMkLst>
+          <pc:docMk/>
+          <pc:sldMk cId="1107828797" sldId="463"/>
+        </pc:sldMkLst>
+      </pc:sldChg>
+      <pc:sldChg chg="modSp new mod modShow">
+        <pc:chgData name="Adrien Osakwe" userId="7a3e290c-eb83-484b-8e3d-d46ef2333477" providerId="ADAL" clId="{6FBBC003-63E5-4DAA-8405-CD7EEDECBC2E}" dt="2024-02-14T16:01:30.496" v="3472" actId="729"/>
+        <pc:sldMkLst>
+          <pc:docMk/>
+          <pc:sldMk cId="1154444114" sldId="463"/>
+        </pc:sldMkLst>
+      </pc:sldChg>
+      <pc:sldChg chg="modSp new mod modAnim">
+        <pc:chgData name="Adrien Osakwe" userId="7a3e290c-eb83-484b-8e3d-d46ef2333477" providerId="ADAL" clId="{6FBBC003-63E5-4DAA-8405-CD7EEDECBC2E}" dt="2024-02-14T04:36:09.146" v="3354"/>
+        <pc:sldMkLst>
+          <pc:docMk/>
+          <pc:sldMk cId="3316432801" sldId="464"/>
+        </pc:sldMkLst>
+      </pc:sldChg>
+      <pc:sldChg chg="modSp new del mod">
+        <pc:chgData name="Adrien Osakwe" userId="7a3e290c-eb83-484b-8e3d-d46ef2333477" providerId="ADAL" clId="{6FBBC003-63E5-4DAA-8405-CD7EEDECBC2E}" dt="2024-02-14T03:45:23.973" v="2968" actId="47"/>
+        <pc:sldMkLst>
+          <pc:docMk/>
+          <pc:sldMk cId="3391832148" sldId="465"/>
+        </pc:sldMkLst>
+      </pc:sldChg>
+      <pc:sldChg chg="modSp new mod">
+        <pc:chgData name="Adrien Osakwe" userId="7a3e290c-eb83-484b-8e3d-d46ef2333477" providerId="ADAL" clId="{6FBBC003-63E5-4DAA-8405-CD7EEDECBC2E}" dt="2024-02-14T03:58:38.991" v="3241" actId="113"/>
+        <pc:sldMkLst>
+          <pc:docMk/>
+          <pc:sldMk cId="3455158526" sldId="466"/>
+        </pc:sldMkLst>
+      </pc:sldChg>
+      <pc:sldChg chg="modSp add mod">
+        <pc:chgData name="Adrien Osakwe" userId="7a3e290c-eb83-484b-8e3d-d46ef2333477" providerId="ADAL" clId="{6FBBC003-63E5-4DAA-8405-CD7EEDECBC2E}" dt="2024-02-14T04:50:25.132" v="3471" actId="113"/>
+        <pc:sldMkLst>
+          <pc:docMk/>
+          <pc:sldMk cId="1696923615" sldId="467"/>
+        </pc:sldMkLst>
+      </pc:sldChg>
+      <pc:sldChg chg="addSp delSp modSp new mod">
+        <pc:chgData name="Adrien Osakwe" userId="7a3e290c-eb83-484b-8e3d-d46ef2333477" providerId="ADAL" clId="{6FBBC003-63E5-4DAA-8405-CD7EEDECBC2E}" dt="2024-02-14T04:31:51.966" v="3303" actId="14100"/>
+        <pc:sldMkLst>
+          <pc:docMk/>
+          <pc:sldMk cId="1381298653" sldId="468"/>
+        </pc:sldMkLst>
+      </pc:sldChg>
+      <pc:sldChg chg="addSp delSp modSp add mod">
+        <pc:chgData name="Adrien Osakwe" userId="7a3e290c-eb83-484b-8e3d-d46ef2333477" providerId="ADAL" clId="{6FBBC003-63E5-4DAA-8405-CD7EEDECBC2E}" dt="2024-02-14T04:35:28.149" v="3351" actId="14100"/>
+        <pc:sldMkLst>
+          <pc:docMk/>
+          <pc:sldMk cId="1069205501" sldId="469"/>
+        </pc:sldMkLst>
+      </pc:sldChg>
+      <pc:sldChg chg="addSp modSp new mod ord">
+        <pc:chgData name="Adrien Osakwe" userId="7a3e290c-eb83-484b-8e3d-d46ef2333477" providerId="ADAL" clId="{6FBBC003-63E5-4DAA-8405-CD7EEDECBC2E}" dt="2024-02-14T04:49:21.479" v="3469" actId="1036"/>
+        <pc:sldMkLst>
+          <pc:docMk/>
+          <pc:sldMk cId="495471787" sldId="470"/>
+        </pc:sldMkLst>
+      </pc:sldChg>
+      <pc:sldChg chg="new del ord">
+        <pc:chgData name="Adrien Osakwe" userId="7a3e290c-eb83-484b-8e3d-d46ef2333477" providerId="ADAL" clId="{6FBBC003-63E5-4DAA-8405-CD7EEDECBC2E}" dt="2024-02-14T04:45:50.059" v="3384" actId="47"/>
+        <pc:sldMkLst>
+          <pc:docMk/>
+          <pc:sldMk cId="3563781567" sldId="470"/>
+        </pc:sldMkLst>
+      </pc:sldChg>
     </pc:docChg>
   </pc:docChgLst>
   <pc:docChgLst>
@@ -1774,561 +2329,6 @@
       </pc:sldChg>
     </pc:docChg>
   </pc:docChgLst>
-  <pc:docChgLst>
-    <pc:chgData name="Adrien Osakwe" userId="7a3e290c-eb83-484b-8e3d-d46ef2333477" providerId="ADAL" clId="{6FBBC003-63E5-4DAA-8405-CD7EEDECBC2E}"/>
-    <pc:docChg chg="undo custSel addSld delSld modSld sldOrd modSection">
-      <pc:chgData name="Adrien Osakwe" userId="7a3e290c-eb83-484b-8e3d-d46ef2333477" providerId="ADAL" clId="{6FBBC003-63E5-4DAA-8405-CD7EEDECBC2E}" dt="2024-02-14T16:01:30.496" v="3472" actId="729"/>
-      <pc:docMkLst>
-        <pc:docMk/>
-      </pc:docMkLst>
-      <pc:sldChg chg="del">
-        <pc:chgData name="Adrien Osakwe" userId="7a3e290c-eb83-484b-8e3d-d46ef2333477" providerId="ADAL" clId="{6FBBC003-63E5-4DAA-8405-CD7EEDECBC2E}" dt="2024-02-13T14:01:53.885" v="149" actId="47"/>
-        <pc:sldMkLst>
-          <pc:docMk/>
-          <pc:sldMk cId="3133242724" sldId="262"/>
-        </pc:sldMkLst>
-      </pc:sldChg>
-      <pc:sldChg chg="modSp mod modAnim">
-        <pc:chgData name="Adrien Osakwe" userId="7a3e290c-eb83-484b-8e3d-d46ef2333477" providerId="ADAL" clId="{6FBBC003-63E5-4DAA-8405-CD7EEDECBC2E}" dt="2024-02-14T04:28:51.003" v="3291" actId="113"/>
-        <pc:sldMkLst>
-          <pc:docMk/>
-          <pc:sldMk cId="3891667287" sldId="277"/>
-        </pc:sldMkLst>
-      </pc:sldChg>
-      <pc:sldChg chg="del">
-        <pc:chgData name="Adrien Osakwe" userId="7a3e290c-eb83-484b-8e3d-d46ef2333477" providerId="ADAL" clId="{6FBBC003-63E5-4DAA-8405-CD7EEDECBC2E}" dt="2024-02-13T14:02:27.239" v="154" actId="47"/>
-        <pc:sldMkLst>
-          <pc:docMk/>
-          <pc:sldMk cId="3390364454" sldId="317"/>
-        </pc:sldMkLst>
-      </pc:sldChg>
-      <pc:sldChg chg="modSp mod">
-        <pc:chgData name="Adrien Osakwe" userId="7a3e290c-eb83-484b-8e3d-d46ef2333477" providerId="ADAL" clId="{6FBBC003-63E5-4DAA-8405-CD7EEDECBC2E}" dt="2024-02-14T04:39:54.220" v="3366" actId="20577"/>
-        <pc:sldMkLst>
-          <pc:docMk/>
-          <pc:sldMk cId="3440444125" sldId="318"/>
-        </pc:sldMkLst>
-      </pc:sldChg>
-      <pc:sldChg chg="addSp delSp modSp mod">
-        <pc:chgData name="Adrien Osakwe" userId="7a3e290c-eb83-484b-8e3d-d46ef2333477" providerId="ADAL" clId="{6FBBC003-63E5-4DAA-8405-CD7EEDECBC2E}" dt="2024-02-14T00:48:00.918" v="1450" actId="20577"/>
-        <pc:sldMkLst>
-          <pc:docMk/>
-          <pc:sldMk cId="2289177498" sldId="319"/>
-        </pc:sldMkLst>
-      </pc:sldChg>
-      <pc:sldChg chg="addSp delSp modSp mod">
-        <pc:chgData name="Adrien Osakwe" userId="7a3e290c-eb83-484b-8e3d-d46ef2333477" providerId="ADAL" clId="{6FBBC003-63E5-4DAA-8405-CD7EEDECBC2E}" dt="2024-02-13T14:19:01.310" v="185" actId="20577"/>
-        <pc:sldMkLst>
-          <pc:docMk/>
-          <pc:sldMk cId="2200063611" sldId="320"/>
-        </pc:sldMkLst>
-      </pc:sldChg>
-      <pc:sldChg chg="add ord">
-        <pc:chgData name="Adrien Osakwe" userId="7a3e290c-eb83-484b-8e3d-d46ef2333477" providerId="ADAL" clId="{6FBBC003-63E5-4DAA-8405-CD7EEDECBC2E}" dt="2024-02-13T14:01:56.886" v="152"/>
-        <pc:sldMkLst>
-          <pc:docMk/>
-          <pc:sldMk cId="1324269546" sldId="395"/>
-        </pc:sldMkLst>
-      </pc:sldChg>
-      <pc:sldChg chg="addSp modSp add mod ord">
-        <pc:chgData name="Adrien Osakwe" userId="7a3e290c-eb83-484b-8e3d-d46ef2333477" providerId="ADAL" clId="{6FBBC003-63E5-4DAA-8405-CD7EEDECBC2E}" dt="2024-02-14T00:45:41.456" v="1347" actId="208"/>
-        <pc:sldMkLst>
-          <pc:docMk/>
-          <pc:sldMk cId="3301951615" sldId="396"/>
-        </pc:sldMkLst>
-      </pc:sldChg>
-      <pc:sldChg chg="add">
-        <pc:chgData name="Adrien Osakwe" userId="7a3e290c-eb83-484b-8e3d-d46ef2333477" providerId="ADAL" clId="{6FBBC003-63E5-4DAA-8405-CD7EEDECBC2E}" dt="2024-02-13T14:02:28.836" v="155"/>
-        <pc:sldMkLst>
-          <pc:docMk/>
-          <pc:sldMk cId="25426801" sldId="399"/>
-        </pc:sldMkLst>
-      </pc:sldChg>
-      <pc:sldChg chg="del">
-        <pc:chgData name="Adrien Osakwe" userId="7a3e290c-eb83-484b-8e3d-d46ef2333477" providerId="ADAL" clId="{6FBBC003-63E5-4DAA-8405-CD7EEDECBC2E}" dt="2024-02-13T14:02:22.476" v="153" actId="47"/>
-        <pc:sldMkLst>
-          <pc:docMk/>
-          <pc:sldMk cId="2151930685" sldId="409"/>
-        </pc:sldMkLst>
-      </pc:sldChg>
-      <pc:sldChg chg="modSp modAnim">
-        <pc:chgData name="Adrien Osakwe" userId="7a3e290c-eb83-484b-8e3d-d46ef2333477" providerId="ADAL" clId="{6FBBC003-63E5-4DAA-8405-CD7EEDECBC2E}" dt="2024-02-14T04:29:30.520" v="3292"/>
-        <pc:sldMkLst>
-          <pc:docMk/>
-          <pc:sldMk cId="98069860" sldId="411"/>
-        </pc:sldMkLst>
-      </pc:sldChg>
-      <pc:sldChg chg="modSp mod">
-        <pc:chgData name="Adrien Osakwe" userId="7a3e290c-eb83-484b-8e3d-d46ef2333477" providerId="ADAL" clId="{6FBBC003-63E5-4DAA-8405-CD7EEDECBC2E}" dt="2024-02-14T00:52:12.308" v="1544" actId="20577"/>
-        <pc:sldMkLst>
-          <pc:docMk/>
-          <pc:sldMk cId="4111024130" sldId="412"/>
-        </pc:sldMkLst>
-      </pc:sldChg>
-      <pc:sldChg chg="modSp mod">
-        <pc:chgData name="Adrien Osakwe" userId="7a3e290c-eb83-484b-8e3d-d46ef2333477" providerId="ADAL" clId="{6FBBC003-63E5-4DAA-8405-CD7EEDECBC2E}" dt="2024-02-14T01:46:58.308" v="2599" actId="207"/>
-        <pc:sldMkLst>
-          <pc:docMk/>
-          <pc:sldMk cId="2428786264" sldId="413"/>
-        </pc:sldMkLst>
-      </pc:sldChg>
-      <pc:sldChg chg="modSp mod">
-        <pc:chgData name="Adrien Osakwe" userId="7a3e290c-eb83-484b-8e3d-d46ef2333477" providerId="ADAL" clId="{6FBBC003-63E5-4DAA-8405-CD7EEDECBC2E}" dt="2024-02-14T04:01:19.276" v="3242" actId="207"/>
-        <pc:sldMkLst>
-          <pc:docMk/>
-          <pc:sldMk cId="4293633584" sldId="414"/>
-        </pc:sldMkLst>
-      </pc:sldChg>
-      <pc:sldChg chg="modSp mod">
-        <pc:chgData name="Adrien Osakwe" userId="7a3e290c-eb83-484b-8e3d-d46ef2333477" providerId="ADAL" clId="{6FBBC003-63E5-4DAA-8405-CD7EEDECBC2E}" dt="2024-02-14T04:08:15.728" v="3243" actId="207"/>
-        <pc:sldMkLst>
-          <pc:docMk/>
-          <pc:sldMk cId="1189678410" sldId="415"/>
-        </pc:sldMkLst>
-      </pc:sldChg>
-      <pc:sldChg chg="modSp mod">
-        <pc:chgData name="Adrien Osakwe" userId="7a3e290c-eb83-484b-8e3d-d46ef2333477" providerId="ADAL" clId="{6FBBC003-63E5-4DAA-8405-CD7EEDECBC2E}" dt="2024-02-14T04:11:47.623" v="3246" actId="207"/>
-        <pc:sldMkLst>
-          <pc:docMk/>
-          <pc:sldMk cId="2444987695" sldId="416"/>
-        </pc:sldMkLst>
-      </pc:sldChg>
-      <pc:sldChg chg="modSp add del mod">
-        <pc:chgData name="Adrien Osakwe" userId="7a3e290c-eb83-484b-8e3d-d46ef2333477" providerId="ADAL" clId="{6FBBC003-63E5-4DAA-8405-CD7EEDECBC2E}" dt="2024-02-14T03:55:29.429" v="2969" actId="207"/>
-        <pc:sldMkLst>
-          <pc:docMk/>
-          <pc:sldMk cId="439019801" sldId="417"/>
-        </pc:sldMkLst>
-      </pc:sldChg>
-      <pc:sldChg chg="modSp del mod">
-        <pc:chgData name="Adrien Osakwe" userId="7a3e290c-eb83-484b-8e3d-d46ef2333477" providerId="ADAL" clId="{6FBBC003-63E5-4DAA-8405-CD7EEDECBC2E}" dt="2024-02-14T02:39:17.480" v="2962" actId="2696"/>
-        <pc:sldMkLst>
-          <pc:docMk/>
-          <pc:sldMk cId="2634833872" sldId="417"/>
-        </pc:sldMkLst>
-      </pc:sldChg>
-      <pc:sldChg chg="modSp mod">
-        <pc:chgData name="Adrien Osakwe" userId="7a3e290c-eb83-484b-8e3d-d46ef2333477" providerId="ADAL" clId="{6FBBC003-63E5-4DAA-8405-CD7EEDECBC2E}" dt="2024-02-14T04:11:36.152" v="3244" actId="207"/>
-        <pc:sldMkLst>
-          <pc:docMk/>
-          <pc:sldMk cId="1346597622" sldId="418"/>
-        </pc:sldMkLst>
-      </pc:sldChg>
-      <pc:sldChg chg="add">
-        <pc:chgData name="Adrien Osakwe" userId="7a3e290c-eb83-484b-8e3d-d46ef2333477" providerId="ADAL" clId="{6FBBC003-63E5-4DAA-8405-CD7EEDECBC2E}" dt="2024-02-14T03:45:21.495" v="2967"/>
-        <pc:sldMkLst>
-          <pc:docMk/>
-          <pc:sldMk cId="513973128" sldId="419"/>
-        </pc:sldMkLst>
-      </pc:sldChg>
-      <pc:sldChg chg="modSp del mod">
-        <pc:chgData name="Adrien Osakwe" userId="7a3e290c-eb83-484b-8e3d-d46ef2333477" providerId="ADAL" clId="{6FBBC003-63E5-4DAA-8405-CD7EEDECBC2E}" dt="2024-02-14T02:39:17.480" v="2962" actId="2696"/>
-        <pc:sldMkLst>
-          <pc:docMk/>
-          <pc:sldMk cId="2227572526" sldId="419"/>
-        </pc:sldMkLst>
-      </pc:sldChg>
-      <pc:sldChg chg="add del">
-        <pc:chgData name="Adrien Osakwe" userId="7a3e290c-eb83-484b-8e3d-d46ef2333477" providerId="ADAL" clId="{6FBBC003-63E5-4DAA-8405-CD7EEDECBC2E}" dt="2024-02-14T03:45:16.997" v="2966" actId="2696"/>
-        <pc:sldMkLst>
-          <pc:docMk/>
-          <pc:sldMk cId="3785448673" sldId="419"/>
-        </pc:sldMkLst>
-      </pc:sldChg>
-      <pc:sldChg chg="modSp mod">
-        <pc:chgData name="Adrien Osakwe" userId="7a3e290c-eb83-484b-8e3d-d46ef2333477" providerId="ADAL" clId="{6FBBC003-63E5-4DAA-8405-CD7EEDECBC2E}" dt="2024-02-13T14:48:56.653" v="217" actId="113"/>
-        <pc:sldMkLst>
-          <pc:docMk/>
-          <pc:sldMk cId="1880436319" sldId="420"/>
-        </pc:sldMkLst>
-      </pc:sldChg>
-      <pc:sldChg chg="modSp mod ord">
-        <pc:chgData name="Adrien Osakwe" userId="7a3e290c-eb83-484b-8e3d-d46ef2333477" providerId="ADAL" clId="{6FBBC003-63E5-4DAA-8405-CD7EEDECBC2E}" dt="2024-02-14T02:28:44.632" v="2646"/>
-        <pc:sldMkLst>
-          <pc:docMk/>
-          <pc:sldMk cId="1410062465" sldId="421"/>
-        </pc:sldMkLst>
-      </pc:sldChg>
-      <pc:sldChg chg="modSp mod ord">
-        <pc:chgData name="Adrien Osakwe" userId="7a3e290c-eb83-484b-8e3d-d46ef2333477" providerId="ADAL" clId="{6FBBC003-63E5-4DAA-8405-CD7EEDECBC2E}" dt="2024-02-14T02:27:47.922" v="2644"/>
-        <pc:sldMkLst>
-          <pc:docMk/>
-          <pc:sldMk cId="108575568" sldId="423"/>
-        </pc:sldMkLst>
-      </pc:sldChg>
-      <pc:sldChg chg="modSp mod">
-        <pc:chgData name="Adrien Osakwe" userId="7a3e290c-eb83-484b-8e3d-d46ef2333477" providerId="ADAL" clId="{6FBBC003-63E5-4DAA-8405-CD7EEDECBC2E}" dt="2024-02-14T02:08:06.158" v="2642" actId="5736"/>
-        <pc:sldMkLst>
-          <pc:docMk/>
-          <pc:sldMk cId="1212990023" sldId="425"/>
-        </pc:sldMkLst>
-      </pc:sldChg>
-      <pc:sldChg chg="modSp mod">
-        <pc:chgData name="Adrien Osakwe" userId="7a3e290c-eb83-484b-8e3d-d46ef2333477" providerId="ADAL" clId="{6FBBC003-63E5-4DAA-8405-CD7EEDECBC2E}" dt="2024-02-13T14:48:59.570" v="218" actId="113"/>
-        <pc:sldMkLst>
-          <pc:docMk/>
-          <pc:sldMk cId="3223212124" sldId="426"/>
-        </pc:sldMkLst>
-      </pc:sldChg>
-      <pc:sldChg chg="modSp mod">
-        <pc:chgData name="Adrien Osakwe" userId="7a3e290c-eb83-484b-8e3d-d46ef2333477" providerId="ADAL" clId="{6FBBC003-63E5-4DAA-8405-CD7EEDECBC2E}" dt="2024-02-13T14:49:02.150" v="219" actId="113"/>
-        <pc:sldMkLst>
-          <pc:docMk/>
-          <pc:sldMk cId="4245281921" sldId="428"/>
-        </pc:sldMkLst>
-      </pc:sldChg>
-      <pc:sldChg chg="modSp mod">
-        <pc:chgData name="Adrien Osakwe" userId="7a3e290c-eb83-484b-8e3d-d46ef2333477" providerId="ADAL" clId="{6FBBC003-63E5-4DAA-8405-CD7EEDECBC2E}" dt="2024-02-13T14:49:04.485" v="220" actId="113"/>
-        <pc:sldMkLst>
-          <pc:docMk/>
-          <pc:sldMk cId="3281809004" sldId="429"/>
-        </pc:sldMkLst>
-      </pc:sldChg>
-      <pc:sldChg chg="modSp mod">
-        <pc:chgData name="Adrien Osakwe" userId="7a3e290c-eb83-484b-8e3d-d46ef2333477" providerId="ADAL" clId="{6FBBC003-63E5-4DAA-8405-CD7EEDECBC2E}" dt="2024-02-13T14:48:10.877" v="205" actId="113"/>
-        <pc:sldMkLst>
-          <pc:docMk/>
-          <pc:sldMk cId="2267835305" sldId="430"/>
-        </pc:sldMkLst>
-      </pc:sldChg>
-      <pc:sldChg chg="modSp mod">
-        <pc:chgData name="Adrien Osakwe" userId="7a3e290c-eb83-484b-8e3d-d46ef2333477" providerId="ADAL" clId="{6FBBC003-63E5-4DAA-8405-CD7EEDECBC2E}" dt="2024-02-14T01:58:50.083" v="2635" actId="5736"/>
-        <pc:sldMkLst>
-          <pc:docMk/>
-          <pc:sldMk cId="2889724734" sldId="431"/>
-        </pc:sldMkLst>
-      </pc:sldChg>
-      <pc:sldChg chg="modSp mod">
-        <pc:chgData name="Adrien Osakwe" userId="7a3e290c-eb83-484b-8e3d-d46ef2333477" providerId="ADAL" clId="{6FBBC003-63E5-4DAA-8405-CD7EEDECBC2E}" dt="2024-02-14T01:26:31.104" v="2443" actId="5736"/>
-        <pc:sldMkLst>
-          <pc:docMk/>
-          <pc:sldMk cId="701040556" sldId="432"/>
-        </pc:sldMkLst>
-      </pc:sldChg>
-      <pc:sldChg chg="del">
-        <pc:chgData name="Adrien Osakwe" userId="7a3e290c-eb83-484b-8e3d-d46ef2333477" providerId="ADAL" clId="{6FBBC003-63E5-4DAA-8405-CD7EEDECBC2E}" dt="2024-02-14T02:34:21.485" v="2647" actId="47"/>
-        <pc:sldMkLst>
-          <pc:docMk/>
-          <pc:sldMk cId="3314207375" sldId="433"/>
-        </pc:sldMkLst>
-      </pc:sldChg>
-      <pc:sldChg chg="del">
-        <pc:chgData name="Adrien Osakwe" userId="7a3e290c-eb83-484b-8e3d-d46ef2333477" providerId="ADAL" clId="{6FBBC003-63E5-4DAA-8405-CD7EEDECBC2E}" dt="2024-02-14T02:39:17.480" v="2962" actId="2696"/>
-        <pc:sldMkLst>
-          <pc:docMk/>
-          <pc:sldMk cId="1029239482" sldId="439"/>
-        </pc:sldMkLst>
-      </pc:sldChg>
-      <pc:sldChg chg="add ord">
-        <pc:chgData name="Adrien Osakwe" userId="7a3e290c-eb83-484b-8e3d-d46ef2333477" providerId="ADAL" clId="{6FBBC003-63E5-4DAA-8405-CD7EEDECBC2E}" dt="2024-02-14T04:36:45.184" v="3356"/>
-        <pc:sldMkLst>
-          <pc:docMk/>
-          <pc:sldMk cId="2459570573" sldId="439"/>
-        </pc:sldMkLst>
-      </pc:sldChg>
-      <pc:sldChg chg="modSp mod">
-        <pc:chgData name="Adrien Osakwe" userId="7a3e290c-eb83-484b-8e3d-d46ef2333477" providerId="ADAL" clId="{6FBBC003-63E5-4DAA-8405-CD7EEDECBC2E}" dt="2024-02-14T04:11:41.916" v="3245" actId="207"/>
-        <pc:sldMkLst>
-          <pc:docMk/>
-          <pc:sldMk cId="4003718646" sldId="441"/>
-        </pc:sldMkLst>
-      </pc:sldChg>
-      <pc:sldChg chg="modSp mod">
-        <pc:chgData name="Adrien Osakwe" userId="7a3e290c-eb83-484b-8e3d-d46ef2333477" providerId="ADAL" clId="{6FBBC003-63E5-4DAA-8405-CD7EEDECBC2E}" dt="2024-02-14T02:03:05.199" v="2637" actId="5736"/>
-        <pc:sldMkLst>
-          <pc:docMk/>
-          <pc:sldMk cId="1491768522" sldId="442"/>
-        </pc:sldMkLst>
-      </pc:sldChg>
-      <pc:sldChg chg="modSp del mod">
-        <pc:chgData name="Adrien Osakwe" userId="7a3e290c-eb83-484b-8e3d-d46ef2333477" providerId="ADAL" clId="{6FBBC003-63E5-4DAA-8405-CD7EEDECBC2E}" dt="2024-02-14T02:39:17.480" v="2962" actId="2696"/>
-        <pc:sldMkLst>
-          <pc:docMk/>
-          <pc:sldMk cId="1920594278" sldId="443"/>
-        </pc:sldMkLst>
-      </pc:sldChg>
-      <pc:sldChg chg="add">
-        <pc:chgData name="Adrien Osakwe" userId="7a3e290c-eb83-484b-8e3d-d46ef2333477" providerId="ADAL" clId="{6FBBC003-63E5-4DAA-8405-CD7EEDECBC2E}" dt="2024-02-14T02:39:24.219" v="2963"/>
-        <pc:sldMkLst>
-          <pc:docMk/>
-          <pc:sldMk cId="4191426825" sldId="443"/>
-        </pc:sldMkLst>
-      </pc:sldChg>
-      <pc:sldChg chg="addSp delSp add mod">
-        <pc:chgData name="Adrien Osakwe" userId="7a3e290c-eb83-484b-8e3d-d46ef2333477" providerId="ADAL" clId="{6FBBC003-63E5-4DAA-8405-CD7EEDECBC2E}" dt="2024-02-14T04:33:50.744" v="3305" actId="22"/>
-        <pc:sldMkLst>
-          <pc:docMk/>
-          <pc:sldMk cId="1956759140" sldId="444"/>
-        </pc:sldMkLst>
-      </pc:sldChg>
-      <pc:sldChg chg="modSp del mod">
-        <pc:chgData name="Adrien Osakwe" userId="7a3e290c-eb83-484b-8e3d-d46ef2333477" providerId="ADAL" clId="{6FBBC003-63E5-4DAA-8405-CD7EEDECBC2E}" dt="2024-02-14T02:39:17.480" v="2962" actId="2696"/>
-        <pc:sldMkLst>
-          <pc:docMk/>
-          <pc:sldMk cId="3928505110" sldId="444"/>
-        </pc:sldMkLst>
-      </pc:sldChg>
-      <pc:sldChg chg="add del">
-        <pc:chgData name="Adrien Osakwe" userId="7a3e290c-eb83-484b-8e3d-d46ef2333477" providerId="ADAL" clId="{6FBBC003-63E5-4DAA-8405-CD7EEDECBC2E}" dt="2024-02-14T03:45:16.997" v="2966" actId="2696"/>
-        <pc:sldMkLst>
-          <pc:docMk/>
-          <pc:sldMk cId="3288183379" sldId="445"/>
-        </pc:sldMkLst>
-      </pc:sldChg>
-      <pc:sldChg chg="modSp del mod">
-        <pc:chgData name="Adrien Osakwe" userId="7a3e290c-eb83-484b-8e3d-d46ef2333477" providerId="ADAL" clId="{6FBBC003-63E5-4DAA-8405-CD7EEDECBC2E}" dt="2024-02-14T02:39:17.480" v="2962" actId="2696"/>
-        <pc:sldMkLst>
-          <pc:docMk/>
-          <pc:sldMk cId="3964093048" sldId="445"/>
-        </pc:sldMkLst>
-      </pc:sldChg>
-      <pc:sldChg chg="add">
-        <pc:chgData name="Adrien Osakwe" userId="7a3e290c-eb83-484b-8e3d-d46ef2333477" providerId="ADAL" clId="{6FBBC003-63E5-4DAA-8405-CD7EEDECBC2E}" dt="2024-02-14T03:45:21.495" v="2967"/>
-        <pc:sldMkLst>
-          <pc:docMk/>
-          <pc:sldMk cId="4109084214" sldId="445"/>
-        </pc:sldMkLst>
-      </pc:sldChg>
-      <pc:sldChg chg="modSp mod">
-        <pc:chgData name="Adrien Osakwe" userId="7a3e290c-eb83-484b-8e3d-d46ef2333477" providerId="ADAL" clId="{6FBBC003-63E5-4DAA-8405-CD7EEDECBC2E}" dt="2024-02-13T14:49:28.195" v="227" actId="113"/>
-        <pc:sldMkLst>
-          <pc:docMk/>
-          <pc:sldMk cId="250423083" sldId="446"/>
-        </pc:sldMkLst>
-      </pc:sldChg>
-      <pc:sldChg chg="modSp mod">
-        <pc:chgData name="Adrien Osakwe" userId="7a3e290c-eb83-484b-8e3d-d46ef2333477" providerId="ADAL" clId="{6FBBC003-63E5-4DAA-8405-CD7EEDECBC2E}" dt="2024-02-13T14:49:35.677" v="229" actId="113"/>
-        <pc:sldMkLst>
-          <pc:docMk/>
-          <pc:sldMk cId="241318341" sldId="447"/>
-        </pc:sldMkLst>
-      </pc:sldChg>
-      <pc:sldChg chg="modSp mod">
-        <pc:chgData name="Adrien Osakwe" userId="7a3e290c-eb83-484b-8e3d-d46ef2333477" providerId="ADAL" clId="{6FBBC003-63E5-4DAA-8405-CD7EEDECBC2E}" dt="2024-02-13T14:49:33.805" v="228" actId="113"/>
-        <pc:sldMkLst>
-          <pc:docMk/>
-          <pc:sldMk cId="3470290159" sldId="448"/>
-        </pc:sldMkLst>
-      </pc:sldChg>
-      <pc:sldChg chg="modSp mod">
-        <pc:chgData name="Adrien Osakwe" userId="7a3e290c-eb83-484b-8e3d-d46ef2333477" providerId="ADAL" clId="{6FBBC003-63E5-4DAA-8405-CD7EEDECBC2E}" dt="2024-02-13T14:49:38.270" v="230" actId="113"/>
-        <pc:sldMkLst>
-          <pc:docMk/>
-          <pc:sldMk cId="4269158014" sldId="449"/>
-        </pc:sldMkLst>
-      </pc:sldChg>
-      <pc:sldChg chg="modSp mod">
-        <pc:chgData name="Adrien Osakwe" userId="7a3e290c-eb83-484b-8e3d-d46ef2333477" providerId="ADAL" clId="{6FBBC003-63E5-4DAA-8405-CD7EEDECBC2E}" dt="2024-02-13T14:49:42.160" v="231" actId="113"/>
-        <pc:sldMkLst>
-          <pc:docMk/>
-          <pc:sldMk cId="3813321520" sldId="450"/>
-        </pc:sldMkLst>
-      </pc:sldChg>
-      <pc:sldChg chg="modSp mod">
-        <pc:chgData name="Adrien Osakwe" userId="7a3e290c-eb83-484b-8e3d-d46ef2333477" providerId="ADAL" clId="{6FBBC003-63E5-4DAA-8405-CD7EEDECBC2E}" dt="2024-02-13T14:49:45.404" v="232" actId="113"/>
-        <pc:sldMkLst>
-          <pc:docMk/>
-          <pc:sldMk cId="450508802" sldId="451"/>
-        </pc:sldMkLst>
-      </pc:sldChg>
-      <pc:sldChg chg="modSp mod">
-        <pc:chgData name="Adrien Osakwe" userId="7a3e290c-eb83-484b-8e3d-d46ef2333477" providerId="ADAL" clId="{6FBBC003-63E5-4DAA-8405-CD7EEDECBC2E}" dt="2024-02-13T14:49:47.728" v="233" actId="113"/>
-        <pc:sldMkLst>
-          <pc:docMk/>
-          <pc:sldMk cId="1454694018" sldId="452"/>
-        </pc:sldMkLst>
-      </pc:sldChg>
-      <pc:sldChg chg="del">
-        <pc:chgData name="Adrien Osakwe" userId="7a3e290c-eb83-484b-8e3d-d46ef2333477" providerId="ADAL" clId="{6FBBC003-63E5-4DAA-8405-CD7EEDECBC2E}" dt="2024-02-13T14:50:03.708" v="235" actId="47"/>
-        <pc:sldMkLst>
-          <pc:docMk/>
-          <pc:sldMk cId="920428551" sldId="455"/>
-        </pc:sldMkLst>
-      </pc:sldChg>
-      <pc:sldChg chg="modSp new mod ord">
-        <pc:chgData name="Adrien Osakwe" userId="7a3e290c-eb83-484b-8e3d-d46ef2333477" providerId="ADAL" clId="{6FBBC003-63E5-4DAA-8405-CD7EEDECBC2E}" dt="2024-02-13T14:51:12.178" v="398"/>
-        <pc:sldMkLst>
-          <pc:docMk/>
-          <pc:sldMk cId="3549088750" sldId="455"/>
-        </pc:sldMkLst>
-      </pc:sldChg>
-      <pc:sldChg chg="new del ord">
-        <pc:chgData name="Adrien Osakwe" userId="7a3e290c-eb83-484b-8e3d-d46ef2333477" providerId="ADAL" clId="{6FBBC003-63E5-4DAA-8405-CD7EEDECBC2E}" dt="2024-02-13T19:36:25.973" v="404" actId="47"/>
-        <pc:sldMkLst>
-          <pc:docMk/>
-          <pc:sldMk cId="243438360" sldId="456"/>
-        </pc:sldMkLst>
-      </pc:sldChg>
-      <pc:sldChg chg="new del">
-        <pc:chgData name="Adrien Osakwe" userId="7a3e290c-eb83-484b-8e3d-d46ef2333477" providerId="ADAL" clId="{6FBBC003-63E5-4DAA-8405-CD7EEDECBC2E}" dt="2024-02-13T19:36:18.868" v="400" actId="680"/>
-        <pc:sldMkLst>
-          <pc:docMk/>
-          <pc:sldMk cId="2037220900" sldId="456"/>
-        </pc:sldMkLst>
-      </pc:sldChg>
-      <pc:sldChg chg="del">
-        <pc:chgData name="Adrien Osakwe" userId="7a3e290c-eb83-484b-8e3d-d46ef2333477" providerId="ADAL" clId="{6FBBC003-63E5-4DAA-8405-CD7EEDECBC2E}" dt="2024-02-13T14:50:02.022" v="234" actId="47"/>
-        <pc:sldMkLst>
-          <pc:docMk/>
-          <pc:sldMk cId="2446723814" sldId="456"/>
-        </pc:sldMkLst>
-      </pc:sldChg>
-      <pc:sldChg chg="modSp new del mod ord">
-        <pc:chgData name="Adrien Osakwe" userId="7a3e290c-eb83-484b-8e3d-d46ef2333477" providerId="ADAL" clId="{6FBBC003-63E5-4DAA-8405-CD7EEDECBC2E}" dt="2024-02-14T04:12:39.422" v="3248" actId="47"/>
-        <pc:sldMkLst>
-          <pc:docMk/>
-          <pc:sldMk cId="3430613274" sldId="456"/>
-        </pc:sldMkLst>
-      </pc:sldChg>
-      <pc:sldChg chg="modSp new mod modAnim">
-        <pc:chgData name="Adrien Osakwe" userId="7a3e290c-eb83-484b-8e3d-d46ef2333477" providerId="ADAL" clId="{6FBBC003-63E5-4DAA-8405-CD7EEDECBC2E}" dt="2024-02-14T04:29:53.166" v="3294"/>
-        <pc:sldMkLst>
-          <pc:docMk/>
-          <pc:sldMk cId="4274729827" sldId="457"/>
-        </pc:sldMkLst>
-      </pc:sldChg>
-      <pc:sldChg chg="addSp delSp modSp new mod">
-        <pc:chgData name="Adrien Osakwe" userId="7a3e290c-eb83-484b-8e3d-d46ef2333477" providerId="ADAL" clId="{6FBBC003-63E5-4DAA-8405-CD7EEDECBC2E}" dt="2024-02-14T04:45:28.242" v="3380" actId="1076"/>
-        <pc:sldMkLst>
-          <pc:docMk/>
-          <pc:sldMk cId="3241240956" sldId="458"/>
-        </pc:sldMkLst>
-      </pc:sldChg>
-      <pc:sldChg chg="add del">
-        <pc:chgData name="Adrien Osakwe" userId="7a3e290c-eb83-484b-8e3d-d46ef2333477" providerId="ADAL" clId="{6FBBC003-63E5-4DAA-8405-CD7EEDECBC2E}" dt="2024-02-13T22:15:34.169" v="1126" actId="47"/>
-        <pc:sldMkLst>
-          <pc:docMk/>
-          <pc:sldMk cId="3582742575" sldId="458"/>
-        </pc:sldMkLst>
-      </pc:sldChg>
-      <pc:sldChg chg="new del">
-        <pc:chgData name="Adrien Osakwe" userId="7a3e290c-eb83-484b-8e3d-d46ef2333477" providerId="ADAL" clId="{6FBBC003-63E5-4DAA-8405-CD7EEDECBC2E}" dt="2024-02-14T00:47:16.043" v="1369" actId="47"/>
-        <pc:sldMkLst>
-          <pc:docMk/>
-          <pc:sldMk cId="1250385595" sldId="459"/>
-        </pc:sldMkLst>
-      </pc:sldChg>
-      <pc:sldChg chg="new del">
-        <pc:chgData name="Adrien Osakwe" userId="7a3e290c-eb83-484b-8e3d-d46ef2333477" providerId="ADAL" clId="{6FBBC003-63E5-4DAA-8405-CD7EEDECBC2E}" dt="2024-02-14T00:47:11.127" v="1367" actId="47"/>
-        <pc:sldMkLst>
-          <pc:docMk/>
-          <pc:sldMk cId="2002959969" sldId="459"/>
-        </pc:sldMkLst>
-      </pc:sldChg>
-      <pc:sldChg chg="modSp new mod">
-        <pc:chgData name="Adrien Osakwe" userId="7a3e290c-eb83-484b-8e3d-d46ef2333477" providerId="ADAL" clId="{6FBBC003-63E5-4DAA-8405-CD7EEDECBC2E}" dt="2024-02-14T04:27:33.333" v="3277" actId="20577"/>
-        <pc:sldMkLst>
-          <pc:docMk/>
-          <pc:sldMk cId="2253242404" sldId="459"/>
-        </pc:sldMkLst>
-      </pc:sldChg>
-      <pc:sldChg chg="new del">
-        <pc:chgData name="Adrien Osakwe" userId="7a3e290c-eb83-484b-8e3d-d46ef2333477" providerId="ADAL" clId="{6FBBC003-63E5-4DAA-8405-CD7EEDECBC2E}" dt="2024-02-14T00:52:25.276" v="1546" actId="47"/>
-        <pc:sldMkLst>
-          <pc:docMk/>
-          <pc:sldMk cId="2113721749" sldId="460"/>
-        </pc:sldMkLst>
-      </pc:sldChg>
-      <pc:sldChg chg="addSp delSp modSp new mod modAnim">
-        <pc:chgData name="Adrien Osakwe" userId="7a3e290c-eb83-484b-8e3d-d46ef2333477" providerId="ADAL" clId="{6FBBC003-63E5-4DAA-8405-CD7EEDECBC2E}" dt="2024-02-14T04:28:12.365" v="3288" actId="12"/>
-        <pc:sldMkLst>
-          <pc:docMk/>
-          <pc:sldMk cId="4225761275" sldId="460"/>
-        </pc:sldMkLst>
-      </pc:sldChg>
-      <pc:sldChg chg="addSp modSp new del mod">
-        <pc:chgData name="Adrien Osakwe" userId="7a3e290c-eb83-484b-8e3d-d46ef2333477" providerId="ADAL" clId="{6FBBC003-63E5-4DAA-8405-CD7EEDECBC2E}" dt="2024-02-14T00:59:52.860" v="1983" actId="47"/>
-        <pc:sldMkLst>
-          <pc:docMk/>
-          <pc:sldMk cId="69382932" sldId="461"/>
-        </pc:sldMkLst>
-      </pc:sldChg>
-      <pc:sldChg chg="addSp delSp modSp new mod modAnim">
-        <pc:chgData name="Adrien Osakwe" userId="7a3e290c-eb83-484b-8e3d-d46ef2333477" providerId="ADAL" clId="{6FBBC003-63E5-4DAA-8405-CD7EEDECBC2E}" dt="2024-02-14T04:30:08.580" v="3296"/>
-        <pc:sldMkLst>
-          <pc:docMk/>
-          <pc:sldMk cId="2801728874" sldId="461"/>
-        </pc:sldMkLst>
-      </pc:sldChg>
-      <pc:sldChg chg="addSp delSp modSp new mod">
-        <pc:chgData name="Adrien Osakwe" userId="7a3e290c-eb83-484b-8e3d-d46ef2333477" providerId="ADAL" clId="{6FBBC003-63E5-4DAA-8405-CD7EEDECBC2E}" dt="2024-02-14T01:41:39.448" v="2595" actId="14100"/>
-        <pc:sldMkLst>
-          <pc:docMk/>
-          <pc:sldMk cId="2048934135" sldId="462"/>
-        </pc:sldMkLst>
-      </pc:sldChg>
-      <pc:sldChg chg="modSp new del mod">
-        <pc:chgData name="Adrien Osakwe" userId="7a3e290c-eb83-484b-8e3d-d46ef2333477" providerId="ADAL" clId="{6FBBC003-63E5-4DAA-8405-CD7EEDECBC2E}" dt="2024-02-14T02:34:52.397" v="2655" actId="47"/>
-        <pc:sldMkLst>
-          <pc:docMk/>
-          <pc:sldMk cId="1107828797" sldId="463"/>
-        </pc:sldMkLst>
-      </pc:sldChg>
-      <pc:sldChg chg="modSp new mod modShow">
-        <pc:chgData name="Adrien Osakwe" userId="7a3e290c-eb83-484b-8e3d-d46ef2333477" providerId="ADAL" clId="{6FBBC003-63E5-4DAA-8405-CD7EEDECBC2E}" dt="2024-02-14T16:01:30.496" v="3472" actId="729"/>
-        <pc:sldMkLst>
-          <pc:docMk/>
-          <pc:sldMk cId="1154444114" sldId="463"/>
-        </pc:sldMkLst>
-      </pc:sldChg>
-      <pc:sldChg chg="modSp new mod modAnim">
-        <pc:chgData name="Adrien Osakwe" userId="7a3e290c-eb83-484b-8e3d-d46ef2333477" providerId="ADAL" clId="{6FBBC003-63E5-4DAA-8405-CD7EEDECBC2E}" dt="2024-02-14T04:36:09.146" v="3354"/>
-        <pc:sldMkLst>
-          <pc:docMk/>
-          <pc:sldMk cId="3316432801" sldId="464"/>
-        </pc:sldMkLst>
-      </pc:sldChg>
-      <pc:sldChg chg="modSp new del mod">
-        <pc:chgData name="Adrien Osakwe" userId="7a3e290c-eb83-484b-8e3d-d46ef2333477" providerId="ADAL" clId="{6FBBC003-63E5-4DAA-8405-CD7EEDECBC2E}" dt="2024-02-14T03:45:23.973" v="2968" actId="47"/>
-        <pc:sldMkLst>
-          <pc:docMk/>
-          <pc:sldMk cId="3391832148" sldId="465"/>
-        </pc:sldMkLst>
-      </pc:sldChg>
-      <pc:sldChg chg="modSp new mod">
-        <pc:chgData name="Adrien Osakwe" userId="7a3e290c-eb83-484b-8e3d-d46ef2333477" providerId="ADAL" clId="{6FBBC003-63E5-4DAA-8405-CD7EEDECBC2E}" dt="2024-02-14T03:58:38.991" v="3241" actId="113"/>
-        <pc:sldMkLst>
-          <pc:docMk/>
-          <pc:sldMk cId="3455158526" sldId="466"/>
-        </pc:sldMkLst>
-      </pc:sldChg>
-      <pc:sldChg chg="modSp add mod">
-        <pc:chgData name="Adrien Osakwe" userId="7a3e290c-eb83-484b-8e3d-d46ef2333477" providerId="ADAL" clId="{6FBBC003-63E5-4DAA-8405-CD7EEDECBC2E}" dt="2024-02-14T04:50:25.132" v="3471" actId="113"/>
-        <pc:sldMkLst>
-          <pc:docMk/>
-          <pc:sldMk cId="1696923615" sldId="467"/>
-        </pc:sldMkLst>
-      </pc:sldChg>
-      <pc:sldChg chg="addSp delSp modSp new mod">
-        <pc:chgData name="Adrien Osakwe" userId="7a3e290c-eb83-484b-8e3d-d46ef2333477" providerId="ADAL" clId="{6FBBC003-63E5-4DAA-8405-CD7EEDECBC2E}" dt="2024-02-14T04:31:51.966" v="3303" actId="14100"/>
-        <pc:sldMkLst>
-          <pc:docMk/>
-          <pc:sldMk cId="1381298653" sldId="468"/>
-        </pc:sldMkLst>
-      </pc:sldChg>
-      <pc:sldChg chg="addSp delSp modSp add mod">
-        <pc:chgData name="Adrien Osakwe" userId="7a3e290c-eb83-484b-8e3d-d46ef2333477" providerId="ADAL" clId="{6FBBC003-63E5-4DAA-8405-CD7EEDECBC2E}" dt="2024-02-14T04:35:28.149" v="3351" actId="14100"/>
-        <pc:sldMkLst>
-          <pc:docMk/>
-          <pc:sldMk cId="1069205501" sldId="469"/>
-        </pc:sldMkLst>
-      </pc:sldChg>
-      <pc:sldChg chg="addSp modSp new mod ord">
-        <pc:chgData name="Adrien Osakwe" userId="7a3e290c-eb83-484b-8e3d-d46ef2333477" providerId="ADAL" clId="{6FBBC003-63E5-4DAA-8405-CD7EEDECBC2E}" dt="2024-02-14T04:49:21.479" v="3469" actId="1036"/>
-        <pc:sldMkLst>
-          <pc:docMk/>
-          <pc:sldMk cId="495471787" sldId="470"/>
-        </pc:sldMkLst>
-      </pc:sldChg>
-      <pc:sldChg chg="new del ord">
-        <pc:chgData name="Adrien Osakwe" userId="7a3e290c-eb83-484b-8e3d-d46ef2333477" providerId="ADAL" clId="{6FBBC003-63E5-4DAA-8405-CD7EEDECBC2E}" dt="2024-02-14T04:45:50.059" v="3384" actId="47"/>
-        <pc:sldMkLst>
-          <pc:docMk/>
-          <pc:sldMk cId="3563781567" sldId="470"/>
-        </pc:sldMkLst>
-      </pc:sldChg>
-    </pc:docChg>
-  </pc:docChgLst>
 </pc:chgInfo>
 </file>
 
@@ -2414,7 +2414,7 @@
           <a:p>
             <a:fld id="{217E5156-1B5D-054E-B5B2-E1B1BA160252}" type="datetimeFigureOut">
               <a:rPr lang="fr-FR" smtClean="0"/>
-              <a:t>13/02/2025</a:t>
+              <a:t>04/07/2025</a:t>
             </a:fld>
             <a:endParaRPr lang="fr-FR"/>
           </a:p>
@@ -11333,7 +11333,7 @@
                   <a:srgbClr val="69B0A0"/>
                 </a:solidFill>
               </a:rPr>
-              <a:t>Lead: Adrien Osakwe</a:t>
+              <a:t>Lead: Maximiliane Jousse</a:t>
             </a:r>
             <a:br>
               <a:rPr lang="en-US" sz="3100" b="1" dirty="0">
@@ -11348,7 +11348,7 @@
                   <a:srgbClr val="69B0A0"/>
                 </a:solidFill>
               </a:rPr>
-              <a:t>Facilitator: Bangli Cao</a:t>
+              <a:t>Facilitator: </a:t>
             </a:r>
             <a:br>
               <a:rPr lang="en-CA" sz="6600" dirty="0">
@@ -11358,11 +11358,15 @@
               </a:rPr>
             </a:br>
             <a:br>
+              <a:rPr lang="en-CA" sz="2200"/>
+            </a:br>
+            <a:r>
+              <a:rPr lang="en-CA" sz="2200"/>
+              <a:t>July 14, </a:t>
+            </a:r>
+            <a:r>
               <a:rPr lang="en-CA" sz="2200" dirty="0"/>
-            </a:br>
-            <a:r>
-              <a:rPr lang="en-CA" sz="2200" dirty="0"/>
-              <a:t>February 13, 2025</a:t>
+              <a:t>2025</a:t>
             </a:r>
             <a:br>
               <a:rPr lang="en-CA" sz="2200" dirty="0"/>

</xml_diff>